<commit_message>
Updated for SQL Saturday Orlando
</commit_message>
<xml_diff>
--- a/Microsoft Fabric/Data - The Fabric Of Our Lives/20231007 - SQL Saturday Orlando - Data - The Fabric Of Our Lives.pptx
+++ b/Microsoft Fabric/Data - The Fabric Of Our Lives/20231007 - SQL Saturday Orlando - Data - The Fabric Of Our Lives.pptx
@@ -10010,7 +10010,7 @@
         </p:spPr>
         <p:txBody>
           <a:bodyPr>
-            <a:normAutofit/>
+            <a:normAutofit lnSpcReduction="10000"/>
           </a:bodyPr>
           <a:lstStyle/>
           <a:p>
@@ -10055,7 +10055,10 @@
           </a:p>
           <a:p>
             <a:pPr algn="l"/>
-            <a:endParaRPr lang="en-US" sz="2400" dirty="0"/>
+            <a:r>
+              <a:rPr lang="en-US" sz="2400" dirty="0"/>
+              <a:t>aka.ms/fabric-roadmap</a:t>
+            </a:r>
           </a:p>
         </p:txBody>
       </p:sp>

</xml_diff>